<commit_message>
Slides - minor touch-up
</commit_message>
<xml_diff>
--- a/Submitted/INFM600_0101_KeenKoalas_GitPackage/INFM600_0101_KeenKoalas_Slides.pptx
+++ b/Submitted/INFM600_0101_KeenKoalas_GitPackage/INFM600_0101_KeenKoalas_Slides.pptx
@@ -243,7 +243,7 @@
           <a:p>
             <a:fld id="{705E03B7-B591-4A2A-B695-014C5A39F13E}" type="datetimeFigureOut">
               <a:rPr lang="en-US"/>
-              <a:t>12/14/2016</a:t>
+              <a:t>12/15/2016</a:t>
             </a:fld>
             <a:endParaRPr dirty="0"/>
           </a:p>
@@ -408,7 +408,7 @@
           <a:p>
             <a:fld id="{67DFBD7B-E4FB-4AA8-9540-FD148073ACB3}" type="datetimeFigureOut">
               <a:rPr lang="en-US"/>
-              <a:t>12/14/2016</a:t>
+              <a:t>12/15/2016</a:t>
             </a:fld>
             <a:endParaRPr dirty="0"/>
           </a:p>
@@ -1035,7 +1035,7 @@
           <a:p>
             <a:fld id="{A7209051-6E81-43E8-9099-FF6A0C3DCFE8}" type="datetime1">
               <a:rPr lang="en-US"/>
-              <a:t>12/14/2016</a:t>
+              <a:t>12/15/2016</a:t>
             </a:fld>
             <a:endParaRPr dirty="0"/>
           </a:p>
@@ -1240,7 +1240,7 @@
           <a:p>
             <a:fld id="{EDCEAB04-7709-4C1E-A61A-74684A0170FC}" type="datetime1">
               <a:rPr lang="en-US"/>
-              <a:t>12/14/2016</a:t>
+              <a:t>12/15/2016</a:t>
             </a:fld>
             <a:endParaRPr dirty="0"/>
           </a:p>
@@ -1794,7 +1794,7 @@
           <a:p>
             <a:fld id="{0C79BD0D-E0B1-4CED-AC65-708AC79EB9CD}" type="datetime1">
               <a:rPr lang="en-US"/>
-              <a:t>12/14/2016</a:t>
+              <a:t>12/15/2016</a:t>
             </a:fld>
             <a:endParaRPr dirty="0"/>
           </a:p>
@@ -1999,7 +1999,7 @@
           <a:p>
             <a:fld id="{0CC3EA6D-DF0B-4D4B-B359-5F1D1D0E30A4}" type="datetime1">
               <a:rPr lang="en-US"/>
-              <a:t>12/14/2016</a:t>
+              <a:t>12/15/2016</a:t>
             </a:fld>
             <a:endParaRPr dirty="0"/>
           </a:p>
@@ -2605,7 +2605,7 @@
           <a:p>
             <a:fld id="{977EDB99-15BC-4479-BAC5-1E502E66917A}" type="datetime1">
               <a:rPr lang="en-US"/>
-              <a:t>12/14/2016</a:t>
+              <a:t>12/15/2016</a:t>
             </a:fld>
             <a:endParaRPr dirty="0"/>
           </a:p>
@@ -2916,7 +2916,7 @@
           <a:p>
             <a:fld id="{4067C2A3-CD19-48AB-9F64-ECCF75182EDD}" type="datetime1">
               <a:rPr lang="en-US"/>
-              <a:t>12/14/2016</a:t>
+              <a:t>12/15/2016</a:t>
             </a:fld>
             <a:endParaRPr dirty="0"/>
           </a:p>
@@ -3373,7 +3373,7 @@
           <a:p>
             <a:fld id="{0363E8C1-7C87-4705-AB97-8CD17D208E3F}" type="datetime1">
               <a:rPr lang="en-US"/>
-              <a:t>12/14/2016</a:t>
+              <a:t>12/15/2016</a:t>
             </a:fld>
             <a:endParaRPr dirty="0"/>
           </a:p>
@@ -3510,7 +3510,7 @@
           <a:p>
             <a:fld id="{E20C624E-DF92-4841-B9B9-DD11AA239B85}" type="datetime1">
               <a:rPr lang="en-US"/>
-              <a:t>12/14/2016</a:t>
+              <a:t>12/15/2016</a:t>
             </a:fld>
             <a:endParaRPr dirty="0"/>
           </a:p>
@@ -3807,7 +3807,7 @@
           <a:p>
             <a:fld id="{FBDA3AE1-4360-4D5B-BDBC-656B872DD533}" type="datetime1">
               <a:rPr lang="en-US"/>
-              <a:t>12/14/2016</a:t>
+              <a:t>12/15/2016</a:t>
             </a:fld>
             <a:endParaRPr dirty="0"/>
           </a:p>
@@ -4108,7 +4108,7 @@
           <a:p>
             <a:fld id="{20990708-46A4-4851-883E-8DFB8939107E}" type="datetime1">
               <a:rPr lang="en-US"/>
-              <a:t>12/14/2016</a:t>
+              <a:t>12/15/2016</a:t>
             </a:fld>
             <a:endParaRPr dirty="0"/>
           </a:p>
@@ -4394,7 +4394,7 @@
           <a:p>
             <a:fld id="{AE88EFFC-86AE-4294-A319-CAFC2651994B}" type="datetime1">
               <a:rPr lang="en-US"/>
-              <a:t>12/14/2016</a:t>
+              <a:t>12/15/2016</a:t>
             </a:fld>
             <a:endParaRPr dirty="0"/>
           </a:p>
@@ -4999,7 +4999,7 @@
             <a:fld id="{D29E8617-6EA8-4B97-A5E8-E18E98765EE2}" type="datetime1">
               <a:rPr lang="en-US"/>
               <a:pPr/>
-              <a:t>12/14/2016</a:t>
+              <a:t>12/15/2016</a:t>
             </a:fld>
             <a:endParaRPr dirty="0"/>
           </a:p>
@@ -5443,11 +5443,7 @@
           <a:p>
             <a:r>
               <a:rPr lang="en-US" dirty="0" smtClean="0"/>
-              <a:t>Pesticide </a:t>
-            </a:r>
-            <a:r>
-              <a:rPr lang="en-US" dirty="0" smtClean="0"/>
-              <a:t>Residue Analysis</a:t>
+              <a:t>Pesticide Residue Analysis</a:t>
             </a:r>
             <a:endParaRPr lang="en-US" dirty="0"/>
           </a:p>
@@ -5743,13 +5739,24 @@
             </a:r>
             <a:r>
               <a:rPr lang="en-US" dirty="0"/>
-              <a:t>smith and Braeburn had the highest average concentrations of the top 10 varieties in </a:t>
-            </a:r>
-            <a:r>
-              <a:rPr lang="en-US" dirty="0" smtClean="0"/>
-              <a:t>2014 at around 0.4 ppm.</a:t>
-            </a:r>
-            <a:endParaRPr lang="en-US" dirty="0" smtClean="0"/>
+              <a:t>S</a:t>
+            </a:r>
+            <a:r>
+              <a:rPr lang="en-US" dirty="0" smtClean="0"/>
+              <a:t>mith </a:t>
+            </a:r>
+            <a:r>
+              <a:rPr lang="en-US" dirty="0"/>
+              <a:t>and Braeburn had the highest average concentrations </a:t>
+            </a:r>
+            <a:r>
+              <a:rPr lang="en-US" dirty="0" smtClean="0"/>
+              <a:t>at </a:t>
+            </a:r>
+            <a:r>
+              <a:rPr lang="en-US" dirty="0" smtClean="0"/>
+              <a:t>around 0.4 ppm.</a:t>
+            </a:r>
           </a:p>
           <a:p>
             <a:r>
@@ -6294,7 +6301,6 @@
               <a:rPr lang="en-US" dirty="0" smtClean="0"/>
               <a:t>)</a:t>
             </a:r>
-            <a:endParaRPr lang="en-US" dirty="0" smtClean="0"/>
           </a:p>
           <a:p>
             <a:r>
@@ -6332,11 +6338,7 @@
           <a:p>
             <a:r>
               <a:rPr lang="en-US" dirty="0" smtClean="0"/>
-              <a:t>A </a:t>
-            </a:r>
-            <a:r>
-              <a:rPr lang="en-US" dirty="0" smtClean="0"/>
-              <a:t>weak </a:t>
+              <a:t>A weak </a:t>
             </a:r>
             <a:r>
               <a:rPr lang="en-US" dirty="0"/>
@@ -6455,13 +6457,8 @@
             </a:r>
             <a:r>
               <a:rPr lang="en-US" dirty="0" smtClean="0"/>
-              <a:t>conventional</a:t>
-            </a:r>
-            <a:r>
-              <a:rPr lang="en-US" dirty="0" smtClean="0"/>
-              <a:t>.</a:t>
-            </a:r>
-            <a:endParaRPr lang="en-US" dirty="0" smtClean="0"/>
+              <a:t>conventional.</a:t>
+            </a:r>
           </a:p>
           <a:p>
             <a:r>
@@ -6492,7 +6489,6 @@
               <a:rPr lang="en-US" dirty="0" smtClean="0"/>
               <a:t>years, indicating possible increased pesticide usage.</a:t>
             </a:r>
-            <a:endParaRPr lang="en-US" dirty="0" smtClean="0"/>
           </a:p>
           <a:p>
             <a:r>
@@ -6898,22 +6894,14 @@
           <a:p>
             <a:r>
               <a:rPr lang="en-US" dirty="0" smtClean="0"/>
-              <a:t>McIntosh apples may be a good </a:t>
-            </a:r>
-            <a:r>
-              <a:rPr lang="en-US" dirty="0" smtClean="0"/>
-              <a:t>variety choice for conventional apples.</a:t>
+              <a:t>McIntosh apples may be a good variety choice for conventional apples.</a:t>
             </a:r>
           </a:p>
           <a:p>
             <a:pPr lvl="1"/>
             <a:r>
               <a:rPr lang="en-US" dirty="0" smtClean="0"/>
-              <a:t>Avoid </a:t>
-            </a:r>
-            <a:r>
-              <a:rPr lang="en-US" dirty="0" smtClean="0"/>
-              <a:t>varieties with higher than average numbers of pesticides to avoid potential risks of chemical mixtures.</a:t>
+              <a:t>Avoid varieties with higher than average numbers of pesticides to avoid potential risks of chemical mixtures.</a:t>
             </a:r>
           </a:p>
           <a:p>
@@ -7903,7 +7891,6 @@
               <a:rPr lang="en-US" dirty="0"/>
               <a:t>://www.sciencedaily.com/releases/2016/02/160217145936.htm</a:t>
             </a:r>
-            <a:endParaRPr lang="en-US" dirty="0"/>
           </a:p>
         </p:txBody>
       </p:sp>
@@ -8700,22 +8687,12 @@
               <a:rPr lang="en-US" dirty="0" smtClean="0"/>
               <a:t>residue.</a:t>
             </a:r>
-            <a:endParaRPr lang="en-US" dirty="0" smtClean="0"/>
-          </a:p>
-          <a:p>
-            <a:r>
-              <a:rPr lang="en-US" dirty="0" smtClean="0"/>
-              <a:t>Pesticides’ effects are greater </a:t>
-            </a:r>
-            <a:r>
-              <a:rPr lang="en-US" dirty="0" smtClean="0"/>
-              <a:t>on </a:t>
-            </a:r>
-            <a:r>
-              <a:rPr lang="en-US" dirty="0" smtClean="0"/>
-              <a:t>children.</a:t>
-            </a:r>
-            <a:endParaRPr lang="en-US" dirty="0" smtClean="0"/>
+          </a:p>
+          <a:p>
+            <a:r>
+              <a:rPr lang="en-US" dirty="0" smtClean="0"/>
+              <a:t>Pesticides’ effects are greater on children.</a:t>
+            </a:r>
           </a:p>
           <a:p>
             <a:pPr lvl="1"/>
@@ -8729,38 +8706,14 @@
             </a:r>
             <a:r>
               <a:rPr lang="en-US" dirty="0" smtClean="0"/>
-              <a:t>(NPIC, </a:t>
-            </a:r>
-            <a:r>
-              <a:rPr lang="en-US" dirty="0" smtClean="0"/>
-              <a:t>2015).</a:t>
+              <a:t>(NPIC, 2015).</a:t>
             </a:r>
           </a:p>
           <a:p>
             <a:pPr lvl="1"/>
             <a:r>
               <a:rPr lang="en-US" dirty="0" smtClean="0"/>
-              <a:t>Children </a:t>
-            </a:r>
-            <a:r>
-              <a:rPr lang="en-US" dirty="0" smtClean="0"/>
-              <a:t>often eat and drink more relative to their body </a:t>
-            </a:r>
-            <a:r>
-              <a:rPr lang="en-US" dirty="0" smtClean="0"/>
-              <a:t>weight than adults, </a:t>
-            </a:r>
-            <a:r>
-              <a:rPr lang="en-US" dirty="0" smtClean="0"/>
-              <a:t>which can lead to a higher dose of pesticide residue per pound of body </a:t>
-            </a:r>
-            <a:r>
-              <a:rPr lang="en-US" dirty="0" smtClean="0"/>
-              <a:t>weight </a:t>
-            </a:r>
-            <a:r>
-              <a:rPr lang="en-US" dirty="0" smtClean="0"/>
-              <a:t>(</a:t>
+              <a:t>Children often eat and drink more relative to their body weight than adults, which can lead to a higher dose of pesticide residue per pound of body weight (</a:t>
             </a:r>
             <a:r>
               <a:rPr lang="en-US" dirty="0"/>
@@ -8770,7 +8723,6 @@
               <a:rPr lang="en-US" dirty="0" smtClean="0"/>
               <a:t>, 2015).</a:t>
             </a:r>
-            <a:endParaRPr lang="en-US" dirty="0" smtClean="0"/>
           </a:p>
           <a:p>
             <a:r>
@@ -8797,16 +8749,23 @@
               <a:rPr lang="en-US" dirty="0" smtClean="0"/>
               <a:t>rodents (Holtcamp, 2012).</a:t>
             </a:r>
-            <a:endParaRPr lang="en-US" dirty="0" smtClean="0"/>
-          </a:p>
-          <a:p>
-            <a:r>
-              <a:rPr lang="en-US" dirty="0" smtClean="0"/>
-              <a:t>M</a:t>
-            </a:r>
-            <a:r>
-              <a:rPr lang="en-US" dirty="0" smtClean="0"/>
-              <a:t>ixtures of different Pesticides may carry additional health risks.</a:t>
+          </a:p>
+          <a:p>
+            <a:r>
+              <a:rPr lang="en-US" dirty="0" smtClean="0"/>
+              <a:t>Mixtures of </a:t>
+            </a:r>
+            <a:r>
+              <a:rPr lang="en-US" smtClean="0"/>
+              <a:t>different </a:t>
+            </a:r>
+            <a:r>
+              <a:rPr lang="en-US" smtClean="0"/>
+              <a:t>pesticides </a:t>
+            </a:r>
+            <a:r>
+              <a:rPr lang="en-US" dirty="0" smtClean="0"/>
+              <a:t>may carry additional health risks.</a:t>
             </a:r>
           </a:p>
           <a:p>
@@ -8815,7 +8774,6 @@
               <a:rPr lang="en-US" dirty="0" smtClean="0"/>
               <a:t>A UCLA study on mixtures of 3 frequently used agricultural fumigants found that the combined effect may be greater resulting in increased cell damage and increased risk of cancer (Wyer, 2016).</a:t>
             </a:r>
-            <a:endParaRPr lang="en-US" dirty="0" smtClean="0"/>
           </a:p>
           <a:p>
             <a:r>
@@ -8849,7 +8807,6 @@
               <a:rPr lang="en-US" dirty="0" smtClean="0"/>
               <a:t>).</a:t>
             </a:r>
-            <a:endParaRPr lang="en-US" dirty="0" smtClean="0"/>
           </a:p>
         </p:txBody>
       </p:sp>
@@ -10118,11 +10075,7 @@
             </a:r>
             <a:r>
               <a:rPr lang="en-US" dirty="0" smtClean="0"/>
-              <a:t>Diphenylamine, </a:t>
-            </a:r>
-            <a:r>
-              <a:rPr lang="en-US" dirty="0" smtClean="0"/>
-              <a:t>Esfenvalerate+Fenvalerate </a:t>
+              <a:t>Diphenylamine, Esfenvalerate+Fenvalerate </a:t>
             </a:r>
             <a:r>
               <a:rPr lang="en-US" dirty="0"/>
@@ -10251,7 +10204,7 @@
         </p:spPr>
         <p:txBody>
           <a:bodyPr>
-            <a:normAutofit fontScale="92500" lnSpcReduction="20000"/>
+            <a:normAutofit fontScale="92500" lnSpcReduction="10000"/>
           </a:bodyPr>
           <a:lstStyle/>
           <a:p>
@@ -10300,28 +10253,21 @@
           <a:p>
             <a:r>
               <a:rPr lang="en-US" dirty="0" smtClean="0"/>
-              <a:t>Regular apples </a:t>
+              <a:t>Conventional apples also had significantly </a:t>
             </a:r>
             <a:r>
               <a:rPr lang="en-US" dirty="0"/>
-              <a:t>in 2014 </a:t>
-            </a:r>
-            <a:r>
-              <a:rPr lang="en-US" dirty="0" smtClean="0"/>
-              <a:t>had </a:t>
-            </a:r>
-            <a:r>
-              <a:rPr lang="en-US" dirty="0"/>
-              <a:t>significantly higher </a:t>
-            </a:r>
-            <a:r>
-              <a:rPr lang="en-US" dirty="0" smtClean="0"/>
-              <a:t>average pesticide concentrations than </a:t>
-            </a:r>
-            <a:r>
-              <a:rPr lang="en-US" dirty="0"/>
-              <a:t>their organic counterparts. </a:t>
-            </a:r>
+              <a:t>higher </a:t>
+            </a:r>
+            <a:r>
+              <a:rPr lang="en-US" dirty="0" smtClean="0"/>
+              <a:t>average pesticide </a:t>
+            </a:r>
+            <a:r>
+              <a:rPr lang="en-US" dirty="0" smtClean="0"/>
+              <a:t>concentrations.</a:t>
+            </a:r>
+            <a:endParaRPr lang="en-US" dirty="0"/>
           </a:p>
         </p:txBody>
       </p:sp>

</xml_diff>